<commit_message>
DOM manipulation - Monday Session
</commit_message>
<xml_diff>
--- a/week_7/session_slides_wk8.pptx
+++ b/week_7/session_slides_wk8.pptx
@@ -4372,7 +4372,7 @@
         <p:spPr>
           <a:xfrm>
             <a:off x="651558" y="981455"/>
-            <a:ext cx="11098482" cy="5145126"/>
+            <a:ext cx="11098482" cy="5606791"/>
           </a:xfrm>
           <a:prstGeom prst="rect">
             <a:avLst/>
@@ -4421,27 +4421,8 @@
                 <a:ea typeface="Open Sans" panose="020B0606030504020204" pitchFamily="34" charset="0"/>
                 <a:cs typeface="Open Sans" panose="020B0606030504020204" pitchFamily="34" charset="0"/>
               </a:rPr>
-              <a:t>No sessions for the </a:t>
+              <a:t>No sessions for the next two weeks</a:t>
             </a:r>
-            <a:r>
-              <a:rPr lang="en-US" sz="2300">
-                <a:solidFill>
-                  <a:schemeClr val="bg1"/>
-                </a:solidFill>
-                <a:latin typeface="Abadi" panose="020B0604020104020204" pitchFamily="34" charset="0"/>
-                <a:ea typeface="Open Sans" panose="020B0606030504020204" pitchFamily="34" charset="0"/>
-                <a:cs typeface="Open Sans" panose="020B0606030504020204" pitchFamily="34" charset="0"/>
-              </a:rPr>
-              <a:t>next two weeks</a:t>
-            </a:r>
-            <a:endParaRPr lang="en-US" sz="2300" dirty="0">
-              <a:solidFill>
-                <a:schemeClr val="bg1"/>
-              </a:solidFill>
-              <a:latin typeface="Abadi" panose="020B0604020104020204" pitchFamily="34" charset="0"/>
-              <a:ea typeface="Open Sans" panose="020B0606030504020204" pitchFamily="34" charset="0"/>
-              <a:cs typeface="Open Sans" panose="020B0606030504020204" pitchFamily="34" charset="0"/>
-            </a:endParaRPr>
           </a:p>
           <a:p>
             <a:pPr marL="342900" indent="-342900">
@@ -4656,6 +4637,46 @@
               </a:lnSpc>
               <a:buFont typeface="Arial" panose="020B0604020202020204" pitchFamily="34" charset="0"/>
               <a:buChar char="•"/>
+            </a:pPr>
+            <a:r>
+              <a:rPr lang="en-US" sz="2000" dirty="0">
+                <a:solidFill>
+                  <a:schemeClr val="bg1"/>
+                </a:solidFill>
+                <a:latin typeface="Abadi" panose="020B0604020104020204" pitchFamily="34" charset="0"/>
+                <a:ea typeface="Open Sans" panose="020B0606030504020204" pitchFamily="34" charset="0"/>
+                <a:cs typeface="Open Sans" panose="020B0606030504020204" pitchFamily="34" charset="0"/>
+              </a:rPr>
+              <a:t>https://</a:t>
+            </a:r>
+            <a:r>
+              <a:rPr lang="en-US" sz="2000" dirty="0" err="1">
+                <a:solidFill>
+                  <a:schemeClr val="bg1"/>
+                </a:solidFill>
+                <a:latin typeface="Abadi" panose="020B0604020104020204" pitchFamily="34" charset="0"/>
+                <a:ea typeface="Open Sans" panose="020B0606030504020204" pitchFamily="34" charset="0"/>
+                <a:cs typeface="Open Sans" panose="020B0606030504020204" pitchFamily="34" charset="0"/>
+              </a:rPr>
+              <a:t>javascript.info</a:t>
+            </a:r>
+            <a:r>
+              <a:rPr lang="en-US" sz="2000" dirty="0">
+                <a:solidFill>
+                  <a:schemeClr val="bg1"/>
+                </a:solidFill>
+                <a:latin typeface="Abadi" panose="020B0604020104020204" pitchFamily="34" charset="0"/>
+                <a:ea typeface="Open Sans" panose="020B0606030504020204" pitchFamily="34" charset="0"/>
+                <a:cs typeface="Open Sans" panose="020B0606030504020204" pitchFamily="34" charset="0"/>
+              </a:rPr>
+              <a:t>/introduction-browser-events</a:t>
+            </a:r>
+          </a:p>
+          <a:p>
+            <a:pPr>
+              <a:lnSpc>
+                <a:spcPct val="150000"/>
+              </a:lnSpc>
             </a:pPr>
             <a:r>
               <a:rPr lang="en-US" sz="2000" dirty="0">

</xml_diff>